<commit_message>
Updated the folders and code
</commit_message>
<xml_diff>
--- a/Presentation_Shimnaz_Recommendation for Real Estate Agency.pptx
+++ b/Presentation_Shimnaz_Recommendation for Real Estate Agency.pptx
@@ -40915,19 +40915,6 @@
                 <a:cs typeface="Times New Roman" panose="02020603050405020304" pitchFamily="18" charset="0"/>
               </a:rPr>
               <a:t>Project Overview</a:t>
-            </a:r>
-          </a:p>
-          <a:p>
-            <a:pPr marL="342900" indent="-342900" algn="l">
-              <a:buFont typeface="Arial" panose="020B0604020202020204" pitchFamily="34" charset="0"/>
-              <a:buChar char="•"/>
-            </a:pPr>
-            <a:r>
-              <a:rPr lang="en-AU" sz="2800" cap="none" dirty="0">
-                <a:latin typeface="Times New Roman" panose="02020603050405020304" pitchFamily="18" charset="0"/>
-                <a:cs typeface="Times New Roman" panose="02020603050405020304" pitchFamily="18" charset="0"/>
-              </a:rPr>
-              <a:t>Data sources for analysis</a:t>
             </a:r>
           </a:p>
           <a:p>

</xml_diff>